<commit_message>
With added slides !
WFMS definition
</commit_message>
<xml_diff>
--- a/presentation/munasir_slides.pptx
+++ b/presentation/munasir_slides.pptx
@@ -5,16 +5,17 @@
     <p:sldMasterId id="2147483660" r:id="rId1"/>
   </p:sldMasterIdLst>
   <p:notesMasterIdLst>
-    <p:notesMasterId r:id="rId9"/>
+    <p:notesMasterId r:id="rId10"/>
   </p:notesMasterIdLst>
   <p:sldIdLst>
-    <p:sldId id="280" r:id="rId2"/>
-    <p:sldId id="274" r:id="rId3"/>
-    <p:sldId id="275" r:id="rId4"/>
-    <p:sldId id="276" r:id="rId5"/>
-    <p:sldId id="277" r:id="rId6"/>
-    <p:sldId id="278" r:id="rId7"/>
-    <p:sldId id="279" r:id="rId8"/>
+    <p:sldId id="281" r:id="rId2"/>
+    <p:sldId id="280" r:id="rId3"/>
+    <p:sldId id="274" r:id="rId4"/>
+    <p:sldId id="275" r:id="rId5"/>
+    <p:sldId id="276" r:id="rId6"/>
+    <p:sldId id="277" r:id="rId7"/>
+    <p:sldId id="278" r:id="rId8"/>
+    <p:sldId id="279" r:id="rId9"/>
   </p:sldIdLst>
   <p:sldSz cx="9144000" cy="6858000" type="screen4x3"/>
   <p:notesSz cx="6858000" cy="9144000"/>
@@ -228,7 +229,7 @@
           <a:p>
             <a:fld id="{56E6D825-14CF-4B20-859D-DEBC615A546A}" type="datetimeFigureOut">
               <a:rPr lang="en-US" smtClean="0"/>
-              <a:t>5/12/2015</a:t>
+              <a:t>5/13/2015</a:t>
             </a:fld>
             <a:endParaRPr lang="en-US"/>
           </a:p>
@@ -680,7 +681,7 @@
           <a:p>
             <a:fld id="{F2853615-BFDE-46DE-814C-47EC6EF6D371}" type="datetimeFigureOut">
               <a:rPr lang="el-GR" smtClean="0"/>
-              <a:t>12/5/2015</a:t>
+              <a:t>13/5/2015</a:t>
             </a:fld>
             <a:endParaRPr lang="el-GR"/>
           </a:p>
@@ -865,7 +866,7 @@
           <a:p>
             <a:fld id="{F2853615-BFDE-46DE-814C-47EC6EF6D371}" type="datetimeFigureOut">
               <a:rPr lang="el-GR" smtClean="0"/>
-              <a:t>12/5/2015</a:t>
+              <a:t>13/5/2015</a:t>
             </a:fld>
             <a:endParaRPr lang="el-GR"/>
           </a:p>
@@ -1055,7 +1056,7 @@
           <a:p>
             <a:fld id="{F2853615-BFDE-46DE-814C-47EC6EF6D371}" type="datetimeFigureOut">
               <a:rPr lang="el-GR" smtClean="0"/>
-              <a:t>12/5/2015</a:t>
+              <a:t>13/5/2015</a:t>
             </a:fld>
             <a:endParaRPr lang="el-GR"/>
           </a:p>
@@ -1258,7 +1259,7 @@
           <a:p>
             <a:fld id="{F2853615-BFDE-46DE-814C-47EC6EF6D371}" type="datetimeFigureOut">
               <a:rPr lang="el-GR" smtClean="0"/>
-              <a:t>12/5/2015</a:t>
+              <a:t>13/5/2015</a:t>
             </a:fld>
             <a:endParaRPr lang="el-GR"/>
           </a:p>
@@ -1514,7 +1515,7 @@
           <a:p>
             <a:fld id="{F2853615-BFDE-46DE-814C-47EC6EF6D371}" type="datetimeFigureOut">
               <a:rPr lang="el-GR" smtClean="0"/>
-              <a:t>12/5/2015</a:t>
+              <a:t>13/5/2015</a:t>
             </a:fld>
             <a:endParaRPr lang="el-GR"/>
           </a:p>
@@ -1786,7 +1787,7 @@
           <a:p>
             <a:fld id="{F2853615-BFDE-46DE-814C-47EC6EF6D371}" type="datetimeFigureOut">
               <a:rPr lang="el-GR" smtClean="0"/>
-              <a:t>12/5/2015</a:t>
+              <a:t>13/5/2015</a:t>
             </a:fld>
             <a:endParaRPr lang="el-GR"/>
           </a:p>
@@ -2248,7 +2249,7 @@
           <a:p>
             <a:fld id="{F2853615-BFDE-46DE-814C-47EC6EF6D371}" type="datetimeFigureOut">
               <a:rPr lang="el-GR" smtClean="0"/>
-              <a:t>12/5/2015</a:t>
+              <a:t>13/5/2015</a:t>
             </a:fld>
             <a:endParaRPr lang="el-GR"/>
           </a:p>
@@ -2425,7 +2426,7 @@
           <a:p>
             <a:fld id="{F2853615-BFDE-46DE-814C-47EC6EF6D371}" type="datetimeFigureOut">
               <a:rPr lang="el-GR" smtClean="0"/>
-              <a:t>12/5/2015</a:t>
+              <a:t>13/5/2015</a:t>
             </a:fld>
             <a:endParaRPr lang="el-GR"/>
           </a:p>
@@ -2527,7 +2528,7 @@
           <a:p>
             <a:fld id="{F2853615-BFDE-46DE-814C-47EC6EF6D371}" type="datetimeFigureOut">
               <a:rPr lang="el-GR" smtClean="0"/>
-              <a:t>12/5/2015</a:t>
+              <a:t>13/5/2015</a:t>
             </a:fld>
             <a:endParaRPr lang="el-GR"/>
           </a:p>
@@ -2814,7 +2815,7 @@
           <a:p>
             <a:fld id="{F2853615-BFDE-46DE-814C-47EC6EF6D371}" type="datetimeFigureOut">
               <a:rPr lang="el-GR" smtClean="0"/>
-              <a:t>12/5/2015</a:t>
+              <a:t>13/5/2015</a:t>
             </a:fld>
             <a:endParaRPr lang="el-GR"/>
           </a:p>
@@ -3077,7 +3078,7 @@
           <a:p>
             <a:fld id="{F2853615-BFDE-46DE-814C-47EC6EF6D371}" type="datetimeFigureOut">
               <a:rPr lang="el-GR" smtClean="0"/>
-              <a:t>12/5/2015</a:t>
+              <a:t>13/5/2015</a:t>
             </a:fld>
             <a:endParaRPr lang="el-GR"/>
           </a:p>
@@ -3264,7 +3265,7 @@
           <a:p>
             <a:fld id="{F2853615-BFDE-46DE-814C-47EC6EF6D371}" type="datetimeFigureOut">
               <a:rPr lang="el-GR" smtClean="0"/>
-              <a:t>12/5/2015</a:t>
+              <a:t>13/5/2015</a:t>
             </a:fld>
             <a:endParaRPr lang="el-GR"/>
           </a:p>
@@ -3700,6 +3701,153 @@
           <a:lstStyle/>
           <a:p>
             <a:r>
+              <a:rPr lang="en-US" dirty="0" smtClean="0"/>
+              <a:t>Workflow Management</a:t>
+            </a:r>
+            <a:endParaRPr lang="en-US" dirty="0"/>
+          </a:p>
+        </p:txBody>
+      </p:sp>
+      <p:sp>
+        <p:nvSpPr>
+          <p:cNvPr id="3" name="Content Placeholder 2"/>
+          <p:cNvSpPr>
+            <a:spLocks noGrp="1"/>
+          </p:cNvSpPr>
+          <p:nvPr>
+            <p:ph idx="1"/>
+          </p:nvPr>
+        </p:nvSpPr>
+        <p:spPr/>
+        <p:txBody>
+          <a:bodyPr/>
+          <a:lstStyle/>
+          <a:p>
+            <a:r>
+              <a:rPr lang="en-US" dirty="0" smtClean="0"/>
+              <a:t>Modeling, executing and monitoring of workflow tasks.</a:t>
+            </a:r>
+          </a:p>
+          <a:p>
+            <a:r>
+              <a:rPr lang="en-US" dirty="0" smtClean="0"/>
+              <a:t>A task can be:</a:t>
+            </a:r>
+          </a:p>
+          <a:p>
+            <a:pPr marL="0" indent="0">
+              <a:buNone/>
+            </a:pPr>
+            <a:r>
+              <a:rPr lang="en-US" dirty="0" smtClean="0"/>
+              <a:t>	- A </a:t>
+            </a:r>
+            <a:r>
+              <a:rPr lang="en-US" dirty="0" err="1" smtClean="0"/>
+              <a:t>javascript</a:t>
+            </a:r>
+            <a:endParaRPr lang="en-US" dirty="0" smtClean="0"/>
+          </a:p>
+          <a:p>
+            <a:pPr marL="0" indent="0">
+              <a:buNone/>
+            </a:pPr>
+            <a:r>
+              <a:rPr lang="en-US" dirty="0"/>
+              <a:t>	</a:t>
+            </a:r>
+            <a:r>
+              <a:rPr lang="en-US" dirty="0" smtClean="0"/>
+              <a:t>- A java process</a:t>
+            </a:r>
+          </a:p>
+          <a:p>
+            <a:pPr marL="0" indent="0">
+              <a:buNone/>
+            </a:pPr>
+            <a:r>
+              <a:rPr lang="en-US" dirty="0"/>
+              <a:t>	</a:t>
+            </a:r>
+            <a:r>
+              <a:rPr lang="en-US" dirty="0" smtClean="0"/>
+              <a:t>- A web service</a:t>
+            </a:r>
+          </a:p>
+          <a:p>
+            <a:pPr marL="0" indent="0">
+              <a:buNone/>
+            </a:pPr>
+            <a:r>
+              <a:rPr lang="en-US" dirty="0"/>
+              <a:t>	</a:t>
+            </a:r>
+            <a:r>
+              <a:rPr lang="en-US" dirty="0" smtClean="0"/>
+              <a:t>- A manual task</a:t>
+            </a:r>
+          </a:p>
+          <a:p>
+            <a:pPr marL="0" indent="0">
+              <a:buNone/>
+            </a:pPr>
+            <a:r>
+              <a:rPr lang="en-US" dirty="0"/>
+              <a:t>	</a:t>
+            </a:r>
+            <a:r>
+              <a:rPr lang="en-US" dirty="0" smtClean="0"/>
+              <a:t>- and etc….</a:t>
+            </a:r>
+          </a:p>
+        </p:txBody>
+      </p:sp>
+    </p:spTree>
+    <p:extLst>
+      <p:ext uri="{BB962C8B-B14F-4D97-AF65-F5344CB8AC3E}">
+        <p14:creationId xmlns:p14="http://schemas.microsoft.com/office/powerpoint/2010/main" val="3651690256"/>
+      </p:ext>
+    </p:extLst>
+  </p:cSld>
+  <p:clrMapOvr>
+    <a:masterClrMapping/>
+  </p:clrMapOvr>
+</p:sld>
+</file>
+
+<file path=ppt/slides/slide2.xml><?xml version="1.0" encoding="utf-8"?>
+<p:sld xmlns:a="http://schemas.openxmlformats.org/drawingml/2006/main" xmlns:r="http://schemas.openxmlformats.org/officeDocument/2006/relationships" xmlns:p="http://schemas.openxmlformats.org/presentationml/2006/main">
+  <p:cSld>
+    <p:spTree>
+      <p:nvGrpSpPr>
+        <p:cNvPr id="1" name=""/>
+        <p:cNvGrpSpPr/>
+        <p:nvPr/>
+      </p:nvGrpSpPr>
+      <p:grpSpPr>
+        <a:xfrm>
+          <a:off x="0" y="0"/>
+          <a:ext cx="0" cy="0"/>
+          <a:chOff x="0" y="0"/>
+          <a:chExt cx="0" cy="0"/>
+        </a:xfrm>
+      </p:grpSpPr>
+      <p:sp>
+        <p:nvSpPr>
+          <p:cNvPr id="2" name="Title 1"/>
+          <p:cNvSpPr>
+            <a:spLocks noGrp="1"/>
+          </p:cNvSpPr>
+          <p:nvPr>
+            <p:ph type="title"/>
+          </p:nvPr>
+        </p:nvSpPr>
+        <p:spPr/>
+        <p:txBody>
+          <a:bodyPr/>
+          <a:lstStyle/>
+          <a:p>
+            <a:r>
               <a:rPr lang="en-US" dirty="0" err="1" smtClean="0"/>
               <a:t>WfMS</a:t>
             </a:r>
@@ -3726,11 +3874,7 @@
           <a:p>
             <a:r>
               <a:rPr lang="en-US" dirty="0" smtClean="0"/>
-              <a:t>Workflow Management </a:t>
-            </a:r>
-            <a:r>
-              <a:rPr lang="en-US" dirty="0" smtClean="0"/>
-              <a:t>System</a:t>
+              <a:t>Workflow Management System</a:t>
             </a:r>
           </a:p>
           <a:p>
@@ -3854,7 +3998,7 @@
 </p:sld>
 </file>
 
-<file path=ppt/slides/slide2.xml><?xml version="1.0" encoding="utf-8"?>
+<file path=ppt/slides/slide3.xml><?xml version="1.0" encoding="utf-8"?>
 <p:sld xmlns:a="http://schemas.openxmlformats.org/drawingml/2006/main" xmlns:r="http://schemas.openxmlformats.org/officeDocument/2006/relationships" xmlns:p="http://schemas.openxmlformats.org/presentationml/2006/main">
   <p:cSld>
     <p:spTree>
@@ -3913,7 +4057,15 @@
           <a:p>
             <a:r>
               <a:rPr lang="en-US" dirty="0" smtClean="0"/>
-              <a:t>A project from LSDIS lab, University of Georgia</a:t>
+              <a:t>A project from </a:t>
+            </a:r>
+            <a:r>
+              <a:rPr lang="en-US" dirty="0" smtClean="0"/>
+              <a:t>LSDIS* </a:t>
+            </a:r>
+            <a:r>
+              <a:rPr lang="en-US" dirty="0" smtClean="0"/>
+              <a:t>lab, University of Georgia</a:t>
             </a:r>
           </a:p>
           <a:p>
@@ -3964,8 +4116,27 @@
           <a:p>
             <a:r>
               <a:rPr lang="en-US" dirty="0" smtClean="0"/>
-              <a:t>How to make it more adaptive?</a:t>
-            </a:r>
+              <a:t>How to make it more adaptive</a:t>
+            </a:r>
+            <a:r>
+              <a:rPr lang="en-US" dirty="0" smtClean="0"/>
+              <a:t>?</a:t>
+            </a:r>
+          </a:p>
+          <a:p>
+            <a:endParaRPr lang="en-US" dirty="0"/>
+          </a:p>
+          <a:p>
+            <a:r>
+              <a:rPr lang="en-US" sz="1400" dirty="0" smtClean="0"/>
+              <a:t>* Large-Scale Distributed Information System</a:t>
+            </a:r>
+          </a:p>
+          <a:p>
+            <a:endParaRPr lang="en-US" dirty="0"/>
+          </a:p>
+          <a:p>
+            <a:endParaRPr lang="en-US" dirty="0" smtClean="0"/>
           </a:p>
           <a:p>
             <a:pPr marL="0" indent="0">
@@ -3988,7 +4159,7 @@
 </p:sld>
 </file>
 
-<file path=ppt/slides/slide3.xml><?xml version="1.0" encoding="utf-8"?>
+<file path=ppt/slides/slide4.xml><?xml version="1.0" encoding="utf-8"?>
 <p:sld xmlns:a="http://schemas.openxmlformats.org/drawingml/2006/main" xmlns:r="http://schemas.openxmlformats.org/officeDocument/2006/relationships" xmlns:p="http://schemas.openxmlformats.org/presentationml/2006/main">
   <p:cSld>
     <p:spTree>
@@ -4132,7 +4303,7 @@
 </p:sld>
 </file>
 
-<file path=ppt/slides/slide4.xml><?xml version="1.0" encoding="utf-8"?>
+<file path=ppt/slides/slide5.xml><?xml version="1.0" encoding="utf-8"?>
 <p:sld xmlns:a="http://schemas.openxmlformats.org/drawingml/2006/main" xmlns:r="http://schemas.openxmlformats.org/officeDocument/2006/relationships" xmlns:p="http://schemas.openxmlformats.org/presentationml/2006/main">
   <p:cSld>
     <p:spTree>
@@ -4188,16 +4359,16 @@
           <a:lstStyle/>
           <a:p>
             <a:r>
-              <a:rPr lang="en-US" dirty="0" smtClean="0"/>
-              <a:t>METEOR </a:t>
-            </a:r>
-            <a:r>
               <a:rPr lang="en-US" dirty="0" err="1" smtClean="0"/>
               <a:t>WfMS</a:t>
             </a:r>
             <a:r>
               <a:rPr lang="en-US" dirty="0" smtClean="0"/>
-              <a:t> is integrated with a simulation tool JSIM</a:t>
+              <a:t> </a:t>
+            </a:r>
+            <a:r>
+              <a:rPr lang="en-US" dirty="0" smtClean="0"/>
+              <a:t>is integrated with a simulation tool JSIM</a:t>
             </a:r>
           </a:p>
           <a:p>
@@ -4251,7 +4422,7 @@
 </p:sld>
 </file>
 
-<file path=ppt/slides/slide5.xml><?xml version="1.0" encoding="utf-8"?>
+<file path=ppt/slides/slide6.xml><?xml version="1.0" encoding="utf-8"?>
 <p:sld xmlns:a="http://schemas.openxmlformats.org/drawingml/2006/main" xmlns:r="http://schemas.openxmlformats.org/officeDocument/2006/relationships" xmlns:p="http://schemas.openxmlformats.org/presentationml/2006/main">
   <p:cSld>
     <p:spTree>
@@ -4333,7 +4504,7 @@
 </p:sld>
 </file>
 
-<file path=ppt/slides/slide6.xml><?xml version="1.0" encoding="utf-8"?>
+<file path=ppt/slides/slide7.xml><?xml version="1.0" encoding="utf-8"?>
 <p:sld xmlns:a="http://schemas.openxmlformats.org/drawingml/2006/main" xmlns:r="http://schemas.openxmlformats.org/officeDocument/2006/relationships" xmlns:p="http://schemas.openxmlformats.org/presentationml/2006/main">
   <p:cSld>
     <p:spTree>
@@ -4497,7 +4668,7 @@
 </p:sld>
 </file>
 
-<file path=ppt/slides/slide7.xml><?xml version="1.0" encoding="utf-8"?>
+<file path=ppt/slides/slide8.xml><?xml version="1.0" encoding="utf-8"?>
 <p:sld xmlns:a="http://schemas.openxmlformats.org/drawingml/2006/main" xmlns:r="http://schemas.openxmlformats.org/officeDocument/2006/relationships" xmlns:p="http://schemas.openxmlformats.org/presentationml/2006/main">
   <p:cSld>
     <p:spTree>

</xml_diff>